<commit_message>
minor fixes flow chart
</commit_message>
<xml_diff>
--- a/doc/model-flow-chart.pptx
+++ b/doc/model-flow-chart.pptx
@@ -197,7 +197,7 @@
           <a:p>
             <a:fld id="{470FF0B4-BFAF-F740-9FB9-9FC391BD2401}" type="datetimeFigureOut">
               <a:rPr lang="en-CH" smtClean="0"/>
-              <a:t>09.12.2024</a:t>
+              <a:t>17.02.2025</a:t>
             </a:fld>
             <a:endParaRPr lang="en-CH"/>
           </a:p>
@@ -680,7 +680,7 @@
           <a:p>
             <a:fld id="{A3227F2F-2C21-704F-954A-51416393FD25}" type="datetimeFigureOut">
               <a:rPr lang="en-CH" smtClean="0"/>
-              <a:t>09.12.2024</a:t>
+              <a:t>17.02.2025</a:t>
             </a:fld>
             <a:endParaRPr lang="en-CH"/>
           </a:p>
@@ -850,7 +850,7 @@
           <a:p>
             <a:fld id="{A3227F2F-2C21-704F-954A-51416393FD25}" type="datetimeFigureOut">
               <a:rPr lang="en-CH" smtClean="0"/>
-              <a:t>09.12.2024</a:t>
+              <a:t>17.02.2025</a:t>
             </a:fld>
             <a:endParaRPr lang="en-CH"/>
           </a:p>
@@ -1030,7 +1030,7 @@
           <a:p>
             <a:fld id="{A3227F2F-2C21-704F-954A-51416393FD25}" type="datetimeFigureOut">
               <a:rPr lang="en-CH" smtClean="0"/>
-              <a:t>09.12.2024</a:t>
+              <a:t>17.02.2025</a:t>
             </a:fld>
             <a:endParaRPr lang="en-CH"/>
           </a:p>
@@ -1200,7 +1200,7 @@
           <a:p>
             <a:fld id="{A3227F2F-2C21-704F-954A-51416393FD25}" type="datetimeFigureOut">
               <a:rPr lang="en-CH" smtClean="0"/>
-              <a:t>09.12.2024</a:t>
+              <a:t>17.02.2025</a:t>
             </a:fld>
             <a:endParaRPr lang="en-CH"/>
           </a:p>
@@ -1446,7 +1446,7 @@
           <a:p>
             <a:fld id="{A3227F2F-2C21-704F-954A-51416393FD25}" type="datetimeFigureOut">
               <a:rPr lang="en-CH" smtClean="0"/>
-              <a:t>09.12.2024</a:t>
+              <a:t>17.02.2025</a:t>
             </a:fld>
             <a:endParaRPr lang="en-CH"/>
           </a:p>
@@ -1678,7 +1678,7 @@
           <a:p>
             <a:fld id="{A3227F2F-2C21-704F-954A-51416393FD25}" type="datetimeFigureOut">
               <a:rPr lang="en-CH" smtClean="0"/>
-              <a:t>09.12.2024</a:t>
+              <a:t>17.02.2025</a:t>
             </a:fld>
             <a:endParaRPr lang="en-CH"/>
           </a:p>
@@ -2045,7 +2045,7 @@
           <a:p>
             <a:fld id="{A3227F2F-2C21-704F-954A-51416393FD25}" type="datetimeFigureOut">
               <a:rPr lang="en-CH" smtClean="0"/>
-              <a:t>09.12.2024</a:t>
+              <a:t>17.02.2025</a:t>
             </a:fld>
             <a:endParaRPr lang="en-CH"/>
           </a:p>
@@ -2163,7 +2163,7 @@
           <a:p>
             <a:fld id="{A3227F2F-2C21-704F-954A-51416393FD25}" type="datetimeFigureOut">
               <a:rPr lang="en-CH" smtClean="0"/>
-              <a:t>09.12.2024</a:t>
+              <a:t>17.02.2025</a:t>
             </a:fld>
             <a:endParaRPr lang="en-CH"/>
           </a:p>
@@ -2258,7 +2258,7 @@
           <a:p>
             <a:fld id="{A3227F2F-2C21-704F-954A-51416393FD25}" type="datetimeFigureOut">
               <a:rPr lang="en-CH" smtClean="0"/>
-              <a:t>09.12.2024</a:t>
+              <a:t>17.02.2025</a:t>
             </a:fld>
             <a:endParaRPr lang="en-CH"/>
           </a:p>
@@ -2535,7 +2535,7 @@
           <a:p>
             <a:fld id="{A3227F2F-2C21-704F-954A-51416393FD25}" type="datetimeFigureOut">
               <a:rPr lang="en-CH" smtClean="0"/>
-              <a:t>09.12.2024</a:t>
+              <a:t>17.02.2025</a:t>
             </a:fld>
             <a:endParaRPr lang="en-CH"/>
           </a:p>
@@ -2792,7 +2792,7 @@
           <a:p>
             <a:fld id="{A3227F2F-2C21-704F-954A-51416393FD25}" type="datetimeFigureOut">
               <a:rPr lang="en-CH" smtClean="0"/>
-              <a:t>09.12.2024</a:t>
+              <a:t>17.02.2025</a:t>
             </a:fld>
             <a:endParaRPr lang="en-CH"/>
           </a:p>
@@ -3005,7 +3005,7 @@
           <a:p>
             <a:fld id="{A3227F2F-2C21-704F-954A-51416393FD25}" type="datetimeFigureOut">
               <a:rPr lang="en-CH" smtClean="0"/>
-              <a:t>09.12.2024</a:t>
+              <a:t>17.02.2025</a:t>
             </a:fld>
             <a:endParaRPr lang="en-CH"/>
           </a:p>
@@ -3461,7 +3461,10 @@
           <a:lstStyle/>
           <a:p>
             <a:pPr algn="ctr"/>
-            <a:endParaRPr lang="en-CH"/>
+            <a:endParaRPr lang="en-CH">
+              <a:latin typeface="Calibri" panose="020F0502020204030204" pitchFamily="34" charset="0"/>
+              <a:cs typeface="Calibri" panose="020F0502020204030204" pitchFamily="34" charset="0"/>
+            </a:endParaRPr>
           </a:p>
         </p:txBody>
       </p:sp>
@@ -3513,7 +3516,10 @@
           <a:lstStyle/>
           <a:p>
             <a:pPr algn="ctr"/>
-            <a:endParaRPr lang="en-CH"/>
+            <a:endParaRPr lang="en-CH">
+              <a:latin typeface="Calibri" panose="020F0502020204030204" pitchFamily="34" charset="0"/>
+              <a:cs typeface="Calibri" panose="020F0502020204030204" pitchFamily="34" charset="0"/>
+            </a:endParaRPr>
           </a:p>
         </p:txBody>
       </p:sp>
@@ -3568,7 +3574,10 @@
           <a:lstStyle/>
           <a:p>
             <a:pPr algn="ctr"/>
-            <a:endParaRPr lang="en-CH" dirty="0"/>
+            <a:endParaRPr lang="en-CH" dirty="0">
+              <a:latin typeface="Calibri" panose="020F0502020204030204" pitchFamily="34" charset="0"/>
+              <a:cs typeface="Calibri" panose="020F0502020204030204" pitchFamily="34" charset="0"/>
+            </a:endParaRPr>
           </a:p>
         </p:txBody>
       </p:sp>
@@ -3627,6 +3636,8 @@
                   <a:lumOff val="80000"/>
                 </a:schemeClr>
               </a:solidFill>
+              <a:latin typeface="Calibri" panose="020F0502020204030204" pitchFamily="34" charset="0"/>
+              <a:cs typeface="Calibri" panose="020F0502020204030204" pitchFamily="34" charset="0"/>
             </a:endParaRPr>
           </a:p>
         </p:txBody>
@@ -3700,7 +3711,10 @@
           <a:p>
             <a:pPr algn="ctr"/>
             <a:r>
-              <a:rPr lang="en-CH" sz="1200" b="1" dirty="0"/>
+              <a:rPr lang="en-CH" sz="1200" b="1" dirty="0">
+                <a:latin typeface="Calibri" panose="020F0502020204030204" pitchFamily="34" charset="0"/>
+                <a:cs typeface="Calibri" panose="020F0502020204030204" pitchFamily="34" charset="0"/>
+              </a:rPr>
               <a:t>Collected data</a:t>
             </a:r>
           </a:p>
@@ -3735,7 +3749,10 @@
           <a:lstStyle/>
           <a:p>
             <a:r>
-              <a:rPr lang="en-CH" sz="1200" b="1" dirty="0"/>
+              <a:rPr lang="en-CH" sz="1200" b="1" dirty="0">
+                <a:latin typeface="Calibri" panose="020F0502020204030204" pitchFamily="34" charset="0"/>
+                <a:cs typeface="Calibri" panose="020F0502020204030204" pitchFamily="34" charset="0"/>
+              </a:rPr>
               <a:t>Modeling</a:t>
             </a:r>
           </a:p>
@@ -3788,16 +3805,25 @@
           <a:lstStyle/>
           <a:p>
             <a:pPr algn="ctr"/>
-            <a:endParaRPr lang="en-CH" sz="1000" b="1" dirty="0"/>
+            <a:endParaRPr lang="en-CH" sz="1000" b="1" dirty="0">
+              <a:latin typeface="Calibri" panose="020F0502020204030204" pitchFamily="34" charset="0"/>
+              <a:cs typeface="Calibri" panose="020F0502020204030204" pitchFamily="34" charset="0"/>
+            </a:endParaRPr>
           </a:p>
           <a:p>
             <a:pPr algn="ctr"/>
-            <a:endParaRPr lang="en-CH" sz="1000" b="1" dirty="0"/>
+            <a:endParaRPr lang="en-CH" sz="1000" b="1" dirty="0">
+              <a:latin typeface="Calibri" panose="020F0502020204030204" pitchFamily="34" charset="0"/>
+              <a:cs typeface="Calibri" panose="020F0502020204030204" pitchFamily="34" charset="0"/>
+            </a:endParaRPr>
           </a:p>
           <a:p>
             <a:pPr algn="ctr"/>
             <a:r>
-              <a:rPr lang="en-CH" sz="1000" b="1" dirty="0"/>
+              <a:rPr lang="en-CH" sz="1000" b="1" dirty="0">
+                <a:latin typeface="Calibri" panose="020F0502020204030204" pitchFamily="34" charset="0"/>
+                <a:cs typeface="Calibri" panose="020F0502020204030204" pitchFamily="34" charset="0"/>
+              </a:rPr>
               <a:t>Environmental</a:t>
             </a:r>
           </a:p>
@@ -3807,19 +3833,31 @@
               <a:buChar char="•"/>
             </a:pPr>
             <a:r>
-              <a:rPr lang="en-CH" sz="800" dirty="0"/>
+              <a:rPr lang="en-CH" sz="800" dirty="0">
+                <a:latin typeface="Calibri" panose="020F0502020204030204" pitchFamily="34" charset="0"/>
+                <a:cs typeface="Calibri" panose="020F0502020204030204" pitchFamily="34" charset="0"/>
+              </a:rPr>
               <a:t>CO</a:t>
             </a:r>
             <a:r>
-              <a:rPr lang="en-CH" sz="800" baseline="-25000" dirty="0"/>
+              <a:rPr lang="en-CH" sz="800" baseline="-25000" dirty="0">
+                <a:latin typeface="Calibri" panose="020F0502020204030204" pitchFamily="34" charset="0"/>
+                <a:cs typeface="Calibri" panose="020F0502020204030204" pitchFamily="34" charset="0"/>
+              </a:rPr>
               <a:t>2</a:t>
             </a:r>
             <a:r>
-              <a:rPr lang="en-CH" sz="800" dirty="0"/>
+              <a:rPr lang="en-CH" sz="800" dirty="0">
+                <a:latin typeface="Calibri" panose="020F0502020204030204" pitchFamily="34" charset="0"/>
+                <a:cs typeface="Calibri" panose="020F0502020204030204" pitchFamily="34" charset="0"/>
+              </a:rPr>
               <a:t> levels</a:t>
             </a:r>
             <a:r>
-              <a:rPr lang="en-CH" sz="800" baseline="-25000" dirty="0"/>
+              <a:rPr lang="en-CH" sz="800" baseline="-25000" dirty="0">
+                <a:latin typeface="Calibri" panose="020F0502020204030204" pitchFamily="34" charset="0"/>
+                <a:cs typeface="Calibri" panose="020F0502020204030204" pitchFamily="34" charset="0"/>
+              </a:rPr>
               <a:t> </a:t>
             </a:r>
           </a:p>
@@ -3872,16 +3910,25 @@
           <a:lstStyle/>
           <a:p>
             <a:pPr algn="ctr"/>
-            <a:endParaRPr lang="en-CH" sz="1000" b="1" dirty="0"/>
+            <a:endParaRPr lang="en-CH" sz="1000" b="1" dirty="0">
+              <a:latin typeface="Calibri" panose="020F0502020204030204" pitchFamily="34" charset="0"/>
+              <a:cs typeface="Calibri" panose="020F0502020204030204" pitchFamily="34" charset="0"/>
+            </a:endParaRPr>
           </a:p>
           <a:p>
             <a:pPr algn="ctr"/>
-            <a:endParaRPr lang="en-CH" sz="1000" b="1" dirty="0"/>
+            <a:endParaRPr lang="en-CH" sz="1000" b="1" dirty="0">
+              <a:latin typeface="Calibri" panose="020F0502020204030204" pitchFamily="34" charset="0"/>
+              <a:cs typeface="Calibri" panose="020F0502020204030204" pitchFamily="34" charset="0"/>
+            </a:endParaRPr>
           </a:p>
           <a:p>
             <a:pPr algn="ctr"/>
             <a:r>
-              <a:rPr lang="en-CH" sz="1000" b="1" dirty="0"/>
+              <a:rPr lang="en-CH" sz="1000" b="1" dirty="0">
+                <a:latin typeface="Calibri" panose="020F0502020204030204" pitchFamily="34" charset="0"/>
+                <a:cs typeface="Calibri" panose="020F0502020204030204" pitchFamily="34" charset="0"/>
+              </a:rPr>
               <a:t>Tracking</a:t>
             </a:r>
           </a:p>
@@ -3891,10 +3938,16 @@
               <a:buChar char="•"/>
             </a:pPr>
             <a:r>
-              <a:rPr lang="en-CH" sz="800" dirty="0"/>
+              <a:rPr lang="en-CH" sz="800" dirty="0">
+                <a:latin typeface="Calibri" panose="020F0502020204030204" pitchFamily="34" charset="0"/>
+                <a:cs typeface="Calibri" panose="020F0502020204030204" pitchFamily="34" charset="0"/>
+              </a:rPr>
               <a:t>Occupancy</a:t>
             </a:r>
-            <a:endParaRPr lang="en-CH" sz="1000" dirty="0"/>
+            <a:endParaRPr lang="en-CH" sz="1000" dirty="0">
+              <a:latin typeface="Calibri" panose="020F0502020204030204" pitchFamily="34" charset="0"/>
+              <a:cs typeface="Calibri" panose="020F0502020204030204" pitchFamily="34" charset="0"/>
+            </a:endParaRPr>
           </a:p>
           <a:p>
             <a:pPr marL="171450" indent="-171450">
@@ -3902,10 +3955,16 @@
               <a:buChar char="•"/>
             </a:pPr>
             <a:r>
-              <a:rPr lang="en-CH" sz="800" dirty="0"/>
+              <a:rPr lang="en-CH" sz="800" dirty="0">
+                <a:latin typeface="Calibri" panose="020F0502020204030204" pitchFamily="34" charset="0"/>
+                <a:cs typeface="Calibri" panose="020F0502020204030204" pitchFamily="34" charset="0"/>
+              </a:rPr>
               <a:t>Movements</a:t>
             </a:r>
-            <a:endParaRPr lang="en-CH" sz="1000" dirty="0"/>
+            <a:endParaRPr lang="en-CH" sz="1000" dirty="0">
+              <a:latin typeface="Calibri" panose="020F0502020204030204" pitchFamily="34" charset="0"/>
+              <a:cs typeface="Calibri" panose="020F0502020204030204" pitchFamily="34" charset="0"/>
+            </a:endParaRPr>
           </a:p>
         </p:txBody>
       </p:sp>
@@ -3956,16 +4015,25 @@
           <a:lstStyle/>
           <a:p>
             <a:pPr algn="ctr"/>
-            <a:endParaRPr lang="en-CH" sz="1000" b="1" dirty="0"/>
+            <a:endParaRPr lang="en-CH" sz="1000" b="1" dirty="0">
+              <a:latin typeface="Calibri" panose="020F0502020204030204" pitchFamily="34" charset="0"/>
+              <a:cs typeface="Calibri" panose="020F0502020204030204" pitchFamily="34" charset="0"/>
+            </a:endParaRPr>
           </a:p>
           <a:p>
             <a:pPr algn="ctr"/>
-            <a:endParaRPr lang="en-CH" sz="1000" b="1" dirty="0"/>
+            <a:endParaRPr lang="en-CH" sz="1000" b="1" dirty="0">
+              <a:latin typeface="Calibri" panose="020F0502020204030204" pitchFamily="34" charset="0"/>
+              <a:cs typeface="Calibri" panose="020F0502020204030204" pitchFamily="34" charset="0"/>
+            </a:endParaRPr>
           </a:p>
           <a:p>
             <a:pPr algn="ctr"/>
             <a:r>
-              <a:rPr lang="en-CH" sz="1000" b="1" dirty="0"/>
+              <a:rPr lang="en-CH" sz="1000" b="1" dirty="0">
+                <a:latin typeface="Calibri" panose="020F0502020204030204" pitchFamily="34" charset="0"/>
+                <a:cs typeface="Calibri" panose="020F0502020204030204" pitchFamily="34" charset="0"/>
+              </a:rPr>
               <a:t>Clinical</a:t>
             </a:r>
           </a:p>
@@ -3975,7 +4043,10 @@
               <a:buChar char="•"/>
             </a:pPr>
             <a:r>
-              <a:rPr lang="en-CH" sz="800" dirty="0"/>
+              <a:rPr lang="en-CH" sz="800" dirty="0">
+                <a:latin typeface="Calibri" panose="020F0502020204030204" pitchFamily="34" charset="0"/>
+                <a:cs typeface="Calibri" panose="020F0502020204030204" pitchFamily="34" charset="0"/>
+              </a:rPr>
               <a:t>Arrival time</a:t>
             </a:r>
           </a:p>
@@ -3985,7 +4056,10 @@
               <a:buChar char="•"/>
             </a:pPr>
             <a:r>
-              <a:rPr lang="en-CH" sz="800" dirty="0"/>
+              <a:rPr lang="en-CH" sz="800" dirty="0">
+                <a:latin typeface="Calibri" panose="020F0502020204030204" pitchFamily="34" charset="0"/>
+                <a:cs typeface="Calibri" panose="020F0502020204030204" pitchFamily="34" charset="0"/>
+              </a:rPr>
               <a:t>TB status</a:t>
             </a:r>
           </a:p>
@@ -4035,7 +4109,10 @@
           <a:p>
             <a:pPr algn="ctr"/>
             <a:r>
-              <a:rPr lang="en-CH" sz="1000" b="1" dirty="0"/>
+              <a:rPr lang="en-CH" sz="1000" b="1" dirty="0">
+                <a:latin typeface="Calibri" panose="020F0502020204030204" pitchFamily="34" charset="0"/>
+                <a:cs typeface="Calibri" panose="020F0502020204030204" pitchFamily="34" charset="0"/>
+              </a:rPr>
               <a:t>Air change rate</a:t>
             </a:r>
           </a:p>
@@ -4045,7 +4122,10 @@
               <a:buChar char="•"/>
             </a:pPr>
             <a:r>
-              <a:rPr lang="en-CH" sz="800" dirty="0"/>
+              <a:rPr lang="en-CH" sz="800" dirty="0">
+                <a:latin typeface="Calibri" panose="020F0502020204030204" pitchFamily="34" charset="0"/>
+                <a:cs typeface="Calibri" panose="020F0502020204030204" pitchFamily="34" charset="0"/>
+              </a:rPr>
               <a:t>Estimated with transient mass balance model</a:t>
             </a:r>
           </a:p>
@@ -4095,7 +4175,10 @@
           <a:p>
             <a:pPr algn="ctr"/>
             <a:r>
-              <a:rPr lang="en-CH" sz="1000" b="1" dirty="0"/>
+              <a:rPr lang="en-CH" sz="1000" b="1" dirty="0">
+                <a:latin typeface="Calibri" panose="020F0502020204030204" pitchFamily="34" charset="0"/>
+                <a:cs typeface="Calibri" panose="020F0502020204030204" pitchFamily="34" charset="0"/>
+              </a:rPr>
               <a:t>Diagnosed TB patients</a:t>
             </a:r>
           </a:p>
@@ -4105,10 +4188,16 @@
               <a:buChar char="•"/>
             </a:pPr>
             <a:r>
-              <a:rPr lang="en-CH" sz="800" dirty="0"/>
+              <a:rPr lang="en-CH" sz="800" dirty="0">
+                <a:latin typeface="Calibri" panose="020F0502020204030204" pitchFamily="34" charset="0"/>
+                <a:cs typeface="Calibri" panose="020F0502020204030204" pitchFamily="34" charset="0"/>
+              </a:rPr>
               <a:t>Spatiotemp. location of infectious patients</a:t>
             </a:r>
-            <a:endParaRPr lang="en-CH" sz="1000" dirty="0"/>
+            <a:endParaRPr lang="en-CH" sz="1000" dirty="0">
+              <a:latin typeface="Calibri" panose="020F0502020204030204" pitchFamily="34" charset="0"/>
+              <a:cs typeface="Calibri" panose="020F0502020204030204" pitchFamily="34" charset="0"/>
+            </a:endParaRPr>
           </a:p>
         </p:txBody>
       </p:sp>
@@ -4156,15 +4245,24 @@
           <a:p>
             <a:pPr algn="ctr"/>
             <a:r>
-              <a:rPr lang="en-CH" sz="1000" b="1" dirty="0"/>
+              <a:rPr lang="en-CH" sz="1000" b="1" dirty="0">
+                <a:latin typeface="Calibri" panose="020F0502020204030204" pitchFamily="34" charset="0"/>
+                <a:cs typeface="Calibri" panose="020F0502020204030204" pitchFamily="34" charset="0"/>
+              </a:rPr>
               <a:t>Q</a:t>
             </a:r>
             <a:r>
-              <a:rPr lang="en-GB" sz="1000" b="1" dirty="0"/>
+              <a:rPr lang="en-GB" sz="1000" b="1" dirty="0">
+                <a:latin typeface="Calibri" panose="020F0502020204030204" pitchFamily="34" charset="0"/>
+                <a:cs typeface="Calibri" panose="020F0502020204030204" pitchFamily="34" charset="0"/>
+              </a:rPr>
               <a:t>u</a:t>
             </a:r>
             <a:r>
-              <a:rPr lang="en-CH" sz="1000" b="1" dirty="0"/>
+              <a:rPr lang="en-CH" sz="1000" b="1" dirty="0">
+                <a:latin typeface="Calibri" panose="020F0502020204030204" pitchFamily="34" charset="0"/>
+                <a:cs typeface="Calibri" panose="020F0502020204030204" pitchFamily="34" charset="0"/>
+              </a:rPr>
               <a:t>anta removal</a:t>
             </a:r>
           </a:p>
@@ -4174,7 +4272,10 @@
               <a:buChar char="•"/>
             </a:pPr>
             <a:r>
-              <a:rPr lang="en-CH" sz="800" dirty="0"/>
+              <a:rPr lang="en-CH" sz="800" dirty="0">
+                <a:latin typeface="Calibri" panose="020F0502020204030204" pitchFamily="34" charset="0"/>
+                <a:cs typeface="Calibri" panose="020F0502020204030204" pitchFamily="34" charset="0"/>
+              </a:rPr>
               <a:t>Outdoor air exchange</a:t>
             </a:r>
           </a:p>
@@ -4184,7 +4285,10 @@
               <a:buChar char="•"/>
             </a:pPr>
             <a:r>
-              <a:rPr lang="en-CH" sz="800" dirty="0"/>
+              <a:rPr lang="en-CH" sz="800" dirty="0">
+                <a:latin typeface="Calibri" panose="020F0502020204030204" pitchFamily="34" charset="0"/>
+                <a:cs typeface="Calibri" panose="020F0502020204030204" pitchFamily="34" charset="0"/>
+              </a:rPr>
               <a:t>Bacterial inactivation </a:t>
             </a:r>
           </a:p>
@@ -4194,10 +4298,16 @@
               <a:buChar char="•"/>
             </a:pPr>
             <a:r>
-              <a:rPr lang="en-CH" sz="800" dirty="0"/>
+              <a:rPr lang="en-CH" sz="800" dirty="0">
+                <a:latin typeface="Calibri" panose="020F0502020204030204" pitchFamily="34" charset="0"/>
+                <a:cs typeface="Calibri" panose="020F0502020204030204" pitchFamily="34" charset="0"/>
+              </a:rPr>
               <a:t>Gravitational settling</a:t>
             </a:r>
-            <a:endParaRPr lang="en-CH" sz="1000" dirty="0"/>
+            <a:endParaRPr lang="en-CH" sz="1000" dirty="0">
+              <a:latin typeface="Calibri" panose="020F0502020204030204" pitchFamily="34" charset="0"/>
+              <a:cs typeface="Calibri" panose="020F0502020204030204" pitchFamily="34" charset="0"/>
+            </a:endParaRPr>
           </a:p>
         </p:txBody>
       </p:sp>
@@ -4245,7 +4355,10 @@
           <a:p>
             <a:pPr algn="ctr"/>
             <a:r>
-              <a:rPr lang="en-CH" sz="1000" b="1" dirty="0"/>
+              <a:rPr lang="en-CH" sz="1000" b="1" dirty="0">
+                <a:latin typeface="Calibri" panose="020F0502020204030204" pitchFamily="34" charset="0"/>
+                <a:cs typeface="Calibri" panose="020F0502020204030204" pitchFamily="34" charset="0"/>
+              </a:rPr>
               <a:t>Quanta diffusion</a:t>
             </a:r>
           </a:p>
@@ -4255,7 +4368,10 @@
               <a:buChar char="•"/>
             </a:pPr>
             <a:r>
-              <a:rPr lang="en-CH" sz="800" dirty="0"/>
+              <a:rPr lang="en-CH" sz="800" dirty="0">
+                <a:latin typeface="Calibri" panose="020F0502020204030204" pitchFamily="34" charset="0"/>
+                <a:cs typeface="Calibri" panose="020F0502020204030204" pitchFamily="34" charset="0"/>
+              </a:rPr>
               <a:t>Radially from generation point</a:t>
             </a:r>
           </a:p>
@@ -4305,7 +4421,10 @@
           <a:p>
             <a:pPr algn="ctr"/>
             <a:r>
-              <a:rPr lang="en-CH" sz="1000" b="1" dirty="0"/>
+              <a:rPr lang="en-CH" sz="1000" b="1" dirty="0">
+                <a:latin typeface="Calibri" panose="020F0502020204030204" pitchFamily="34" charset="0"/>
+                <a:cs typeface="Calibri" panose="020F0502020204030204" pitchFamily="34" charset="0"/>
+              </a:rPr>
               <a:t>Quanta generation</a:t>
             </a:r>
           </a:p>
@@ -4315,10 +4434,16 @@
               <a:buChar char="•"/>
             </a:pPr>
             <a:r>
-              <a:rPr lang="en-CH" sz="800" dirty="0"/>
-              <a:t>Diagnosed + undiagnosed patients</a:t>
-            </a:r>
-            <a:endParaRPr lang="en-CH" sz="1000" dirty="0"/>
+              <a:rPr lang="en-CH" sz="800" dirty="0">
+                <a:latin typeface="Calibri" panose="020F0502020204030204" pitchFamily="34" charset="0"/>
+                <a:cs typeface="Calibri" panose="020F0502020204030204" pitchFamily="34" charset="0"/>
+              </a:rPr>
+              <a:t>Undiagnosed + diagnosed TB patients</a:t>
+            </a:r>
+            <a:endParaRPr lang="en-CH" sz="1000" dirty="0">
+              <a:latin typeface="Calibri" panose="020F0502020204030204" pitchFamily="34" charset="0"/>
+              <a:cs typeface="Calibri" panose="020F0502020204030204" pitchFamily="34" charset="0"/>
+            </a:endParaRPr>
           </a:p>
         </p:txBody>
       </p:sp>
@@ -4371,7 +4496,10 @@
           <a:p>
             <a:pPr algn="ctr"/>
             <a:r>
-              <a:rPr lang="en-CH" sz="1000" b="1" dirty="0"/>
+              <a:rPr lang="en-CH" sz="1000" b="1" dirty="0">
+                <a:latin typeface="Calibri" panose="020F0502020204030204" pitchFamily="34" charset="0"/>
+                <a:cs typeface="Calibri" panose="020F0502020204030204" pitchFamily="34" charset="0"/>
+              </a:rPr>
               <a:t>Risk of infection</a:t>
             </a:r>
           </a:p>
@@ -4381,15 +4509,24 @@
               <a:buChar char="•"/>
             </a:pPr>
             <a:r>
-              <a:rPr lang="en-CH" sz="800" dirty="0"/>
+              <a:rPr lang="en-CH" sz="800" dirty="0">
+                <a:latin typeface="Calibri" panose="020F0502020204030204" pitchFamily="34" charset="0"/>
+                <a:cs typeface="Calibri" panose="020F0502020204030204" pitchFamily="34" charset="0"/>
+              </a:rPr>
               <a:t>Spatiotemp. </a:t>
             </a:r>
             <a:r>
-              <a:rPr lang="en-GB" sz="800" dirty="0"/>
+              <a:rPr lang="en-GB" sz="800" dirty="0">
+                <a:latin typeface="Calibri" panose="020F0502020204030204" pitchFamily="34" charset="0"/>
+                <a:cs typeface="Calibri" panose="020F0502020204030204" pitchFamily="34" charset="0"/>
+              </a:rPr>
               <a:t>q</a:t>
             </a:r>
             <a:r>
-              <a:rPr lang="en-CH" sz="800" dirty="0"/>
+              <a:rPr lang="en-CH" sz="800" dirty="0">
+                <a:latin typeface="Calibri" panose="020F0502020204030204" pitchFamily="34" charset="0"/>
+                <a:cs typeface="Calibri" panose="020F0502020204030204" pitchFamily="34" charset="0"/>
+              </a:rPr>
               <a:t>uanta conc.</a:t>
             </a:r>
           </a:p>
@@ -4399,7 +4536,10 @@
               <a:buChar char="•"/>
             </a:pPr>
             <a:r>
-              <a:rPr lang="en-CH" sz="800" dirty="0"/>
+              <a:rPr lang="en-CH" sz="800" dirty="0">
+                <a:latin typeface="Calibri" panose="020F0502020204030204" pitchFamily="34" charset="0"/>
+                <a:cs typeface="Calibri" panose="020F0502020204030204" pitchFamily="34" charset="0"/>
+              </a:rPr>
               <a:t>Exposure time</a:t>
             </a:r>
           </a:p>
@@ -4415,6 +4555,7 @@
             </a:extLst>
           </p:cNvPr>
           <p:cNvCxnSpPr>
+            <a:cxnSpLocks/>
             <a:stCxn id="8" idx="3"/>
             <a:endCxn id="11" idx="1"/>
           </p:cNvCxnSpPr>
@@ -4551,6 +4692,7 @@
             </a:extLst>
           </p:cNvPr>
           <p:cNvCxnSpPr>
+            <a:cxnSpLocks/>
             <a:stCxn id="6" idx="3"/>
             <a:endCxn id="10" idx="1"/>
           </p:cNvCxnSpPr>
@@ -4779,6 +4921,7 @@
             </a:extLst>
           </p:cNvPr>
           <p:cNvCxnSpPr>
+            <a:cxnSpLocks/>
             <a:stCxn id="7" idx="3"/>
             <a:endCxn id="10" idx="1"/>
           </p:cNvCxnSpPr>
@@ -4859,7 +5002,10 @@
           <a:p>
             <a:pPr algn="ctr"/>
             <a:r>
-              <a:rPr lang="en-CH" sz="1000" dirty="0"/>
+              <a:rPr lang="en-CH" sz="1000" dirty="0">
+                <a:latin typeface="Calibri" panose="020F0502020204030204" pitchFamily="34" charset="0"/>
+                <a:cs typeface="Calibri" panose="020F0502020204030204" pitchFamily="34" charset="0"/>
+              </a:rPr>
               <a:t>1</a:t>
             </a:r>
           </a:p>
@@ -4910,7 +5056,10 @@
           <a:p>
             <a:pPr algn="ctr"/>
             <a:r>
-              <a:rPr lang="en-CH" sz="1000" dirty="0"/>
+              <a:rPr lang="en-CH" sz="1000" dirty="0">
+                <a:latin typeface="Calibri" panose="020F0502020204030204" pitchFamily="34" charset="0"/>
+                <a:cs typeface="Calibri" panose="020F0502020204030204" pitchFamily="34" charset="0"/>
+              </a:rPr>
               <a:t>3</a:t>
             </a:r>
           </a:p>
@@ -4961,7 +5110,10 @@
           <a:p>
             <a:pPr algn="ctr"/>
             <a:r>
-              <a:rPr lang="en-CH" sz="1000" dirty="0"/>
+              <a:rPr lang="en-CH" sz="1000" dirty="0">
+                <a:latin typeface="Calibri" panose="020F0502020204030204" pitchFamily="34" charset="0"/>
+                <a:cs typeface="Calibri" panose="020F0502020204030204" pitchFamily="34" charset="0"/>
+              </a:rPr>
               <a:t>2</a:t>
             </a:r>
           </a:p>
@@ -5012,7 +5164,10 @@
           <a:p>
             <a:pPr algn="ctr"/>
             <a:r>
-              <a:rPr lang="en-CH" sz="1000" dirty="0"/>
+              <a:rPr lang="en-CH" sz="1000" dirty="0">
+                <a:latin typeface="Calibri" panose="020F0502020204030204" pitchFamily="34" charset="0"/>
+                <a:cs typeface="Calibri" panose="020F0502020204030204" pitchFamily="34" charset="0"/>
+              </a:rPr>
               <a:t>4</a:t>
             </a:r>
           </a:p>
@@ -5063,7 +5218,10 @@
           <a:p>
             <a:pPr algn="ctr"/>
             <a:r>
-              <a:rPr lang="en-CH" sz="1000" dirty="0"/>
+              <a:rPr lang="en-CH" sz="1000" dirty="0">
+                <a:latin typeface="Calibri" panose="020F0502020204030204" pitchFamily="34" charset="0"/>
+                <a:cs typeface="Calibri" panose="020F0502020204030204" pitchFamily="34" charset="0"/>
+              </a:rPr>
               <a:t>5</a:t>
             </a:r>
           </a:p>
@@ -5114,7 +5272,10 @@
           <a:p>
             <a:pPr algn="ctr"/>
             <a:r>
-              <a:rPr lang="en-CH" sz="1000" dirty="0"/>
+              <a:rPr lang="en-CH" sz="1000" dirty="0">
+                <a:latin typeface="Calibri" panose="020F0502020204030204" pitchFamily="34" charset="0"/>
+                <a:cs typeface="Calibri" panose="020F0502020204030204" pitchFamily="34" charset="0"/>
+              </a:rPr>
               <a:t>6</a:t>
             </a:r>
           </a:p>
@@ -5180,7 +5341,10 @@
             <a:lstStyle/>
             <a:p>
               <a:pPr algn="ctr"/>
-              <a:endParaRPr lang="en-CH"/>
+              <a:endParaRPr lang="en-CH">
+                <a:latin typeface="Calibri" panose="020F0502020204030204" pitchFamily="34" charset="0"/>
+                <a:cs typeface="Calibri" panose="020F0502020204030204" pitchFamily="34" charset="0"/>
+              </a:endParaRPr>
             </a:p>
           </p:txBody>
         </p:sp>
@@ -5392,7 +5556,10 @@
             <a:lstStyle/>
             <a:p>
               <a:pPr algn="ctr"/>
-              <a:endParaRPr lang="en-CH"/>
+              <a:endParaRPr lang="en-CH">
+                <a:latin typeface="Calibri" panose="020F0502020204030204" pitchFamily="34" charset="0"/>
+                <a:cs typeface="Calibri" panose="020F0502020204030204" pitchFamily="34" charset="0"/>
+              </a:endParaRPr>
             </a:p>
           </p:txBody>
         </p:sp>
@@ -5508,7 +5675,10 @@
             <a:lstStyle/>
             <a:p>
               <a:pPr algn="ctr"/>
-              <a:endParaRPr lang="en-CH"/>
+              <a:endParaRPr lang="en-CH">
+                <a:latin typeface="Calibri" panose="020F0502020204030204" pitchFamily="34" charset="0"/>
+                <a:cs typeface="Calibri" panose="020F0502020204030204" pitchFamily="34" charset="0"/>
+              </a:endParaRPr>
             </a:p>
           </p:txBody>
         </p:sp>
@@ -5555,7 +5725,10 @@
             <a:lstStyle/>
             <a:p>
               <a:pPr algn="ctr"/>
-              <a:endParaRPr lang="en-CH"/>
+              <a:endParaRPr lang="en-CH">
+                <a:latin typeface="Calibri" panose="020F0502020204030204" pitchFamily="34" charset="0"/>
+                <a:cs typeface="Calibri" panose="020F0502020204030204" pitchFamily="34" charset="0"/>
+              </a:endParaRPr>
             </a:p>
           </p:txBody>
         </p:sp>
@@ -5602,7 +5775,10 @@
             <a:lstStyle/>
             <a:p>
               <a:pPr algn="ctr"/>
-              <a:endParaRPr lang="en-CH"/>
+              <a:endParaRPr lang="en-CH">
+                <a:latin typeface="Calibri" panose="020F0502020204030204" pitchFamily="34" charset="0"/>
+                <a:cs typeface="Calibri" panose="020F0502020204030204" pitchFamily="34" charset="0"/>
+              </a:endParaRPr>
             </a:p>
           </p:txBody>
         </p:sp>
@@ -5649,7 +5825,10 @@
             <a:lstStyle/>
             <a:p>
               <a:pPr algn="ctr"/>
-              <a:endParaRPr lang="en-CH"/>
+              <a:endParaRPr lang="en-CH">
+                <a:latin typeface="Calibri" panose="020F0502020204030204" pitchFamily="34" charset="0"/>
+                <a:cs typeface="Calibri" panose="020F0502020204030204" pitchFamily="34" charset="0"/>
+              </a:endParaRPr>
             </a:p>
           </p:txBody>
         </p:sp>

</xml_diff>